<commit_message>
Deleted blank slide and added Github link
</commit_message>
<xml_diff>
--- a/presentation.pptx
+++ b/presentation.pptx
@@ -25,7 +25,6 @@
     <p:sldId id="270" r:id="rId20"/>
     <p:sldId id="271" r:id="rId21"/>
     <p:sldId id="272" r:id="rId22"/>
-    <p:sldId id="273" r:id="rId23"/>
   </p:sldIdLst>
   <p:sldSz cy="6858000" cx="9144000"/>
   <p:notesSz cy="9144000" cx="6858000"/>
@@ -356,7 +355,7 @@
   <p:cSld>
     <p:spTree>
       <p:nvGrpSpPr>
-        <p:cNvPr id="26" name="Shape 26"/>
+        <p:cNvPr id="27" name="Shape 27"/>
         <p:cNvGrpSpPr/>
         <p:nvPr/>
       </p:nvGrpSpPr>
@@ -370,7 +369,7 @@
       </p:grpSpPr>
       <p:sp>
         <p:nvSpPr>
-          <p:cNvPr id="27" name="Shape 27"/>
+          <p:cNvPr id="28" name="Shape 28"/>
           <p:cNvSpPr/>
           <p:nvPr>
             <p:ph idx="2" type="sldImg"/>
@@ -404,7 +403,7 @@
       </p:sp>
       <p:sp>
         <p:nvSpPr>
-          <p:cNvPr id="28" name="Shape 28"/>
+          <p:cNvPr id="29" name="Shape 29"/>
           <p:cNvSpPr txBox="1"/>
           <p:nvPr>
             <p:ph idx="1" type="body"/>
@@ -440,7 +439,7 @@
   <p:cSld>
     <p:spTree>
       <p:nvGrpSpPr>
-        <p:cNvPr id="90" name="Shape 90"/>
+        <p:cNvPr id="91" name="Shape 91"/>
         <p:cNvGrpSpPr/>
         <p:nvPr/>
       </p:nvGrpSpPr>
@@ -454,7 +453,7 @@
       </p:grpSpPr>
       <p:sp>
         <p:nvSpPr>
-          <p:cNvPr id="91" name="Shape 91"/>
+          <p:cNvPr id="92" name="Shape 92"/>
           <p:cNvSpPr/>
           <p:nvPr>
             <p:ph idx="2" type="sldImg"/>
@@ -488,7 +487,7 @@
       </p:sp>
       <p:sp>
         <p:nvSpPr>
-          <p:cNvPr id="92" name="Shape 92"/>
+          <p:cNvPr id="93" name="Shape 93"/>
           <p:cNvSpPr txBox="1"/>
           <p:nvPr>
             <p:ph idx="1" type="body"/>
@@ -776,7 +775,7 @@
   <p:cSld>
     <p:spTree>
       <p:nvGrpSpPr>
-        <p:cNvPr id="111" name="Shape 111"/>
+        <p:cNvPr id="113" name="Shape 113"/>
         <p:cNvGrpSpPr/>
         <p:nvPr/>
       </p:nvGrpSpPr>
@@ -790,7 +789,7 @@
       </p:grpSpPr>
       <p:sp>
         <p:nvSpPr>
-          <p:cNvPr id="112" name="Shape 112"/>
+          <p:cNvPr id="114" name="Shape 114"/>
           <p:cNvSpPr/>
           <p:nvPr>
             <p:ph idx="2" type="sldImg"/>
@@ -824,7 +823,7 @@
       </p:sp>
       <p:sp>
         <p:nvSpPr>
-          <p:cNvPr id="113" name="Shape 113"/>
+          <p:cNvPr id="115" name="Shape 115"/>
           <p:cNvSpPr txBox="1"/>
           <p:nvPr>
             <p:ph idx="1" type="body"/>
@@ -860,7 +859,7 @@
   <p:cSld>
     <p:spTree>
       <p:nvGrpSpPr>
-        <p:cNvPr id="118" name="Shape 118"/>
+        <p:cNvPr id="119" name="Shape 119"/>
         <p:cNvGrpSpPr/>
         <p:nvPr/>
       </p:nvGrpSpPr>
@@ -874,7 +873,7 @@
       </p:grpSpPr>
       <p:sp>
         <p:nvSpPr>
-          <p:cNvPr id="119" name="Shape 119"/>
+          <p:cNvPr id="120" name="Shape 120"/>
           <p:cNvSpPr/>
           <p:nvPr>
             <p:ph idx="2" type="sldImg"/>
@@ -908,7 +907,7 @@
       </p:sp>
       <p:sp>
         <p:nvSpPr>
-          <p:cNvPr id="120" name="Shape 120"/>
+          <p:cNvPr id="121" name="Shape 121"/>
           <p:cNvSpPr txBox="1"/>
           <p:nvPr>
             <p:ph idx="1" type="body"/>
@@ -1028,7 +1027,7 @@
   <p:cSld>
     <p:spTree>
       <p:nvGrpSpPr>
-        <p:cNvPr id="129" name="Shape 129"/>
+        <p:cNvPr id="130" name="Shape 130"/>
         <p:cNvGrpSpPr/>
         <p:nvPr/>
       </p:nvGrpSpPr>
@@ -1042,7 +1041,7 @@
       </p:grpSpPr>
       <p:sp>
         <p:nvSpPr>
-          <p:cNvPr id="130" name="Shape 130"/>
+          <p:cNvPr id="131" name="Shape 131"/>
           <p:cNvSpPr/>
           <p:nvPr>
             <p:ph idx="2" type="sldImg"/>
@@ -1076,7 +1075,7 @@
       </p:sp>
       <p:sp>
         <p:nvSpPr>
-          <p:cNvPr id="131" name="Shape 131"/>
+          <p:cNvPr id="132" name="Shape 132"/>
           <p:cNvSpPr txBox="1"/>
           <p:nvPr>
             <p:ph idx="1" type="body"/>
@@ -1107,12 +1106,12 @@
 </p:notes>
 </file>
 
-<file path=ppt/notesSlides/notesSlide18.xml><?xml version="1.0" encoding="utf-8"?>
+<file path=ppt/notesSlides/notesSlide2.xml><?xml version="1.0" encoding="utf-8"?>
 <p:notes xmlns:a="http://schemas.openxmlformats.org/drawingml/2006/main" xmlns:r="http://schemas.openxmlformats.org/officeDocument/2006/relationships" xmlns:mc="http://schemas.openxmlformats.org/markup-compatibility/2006" xmlns:mv="urn:schemas-microsoft-com:mac:vml" xmlns:p="http://schemas.openxmlformats.org/presentationml/2006/main" xmlns:c="http://schemas.openxmlformats.org/drawingml/2006/chart" xmlns:dgm="http://schemas.openxmlformats.org/drawingml/2006/diagram" xmlns:o="urn:schemas-microsoft-com:office:office" xmlns:v="urn:schemas-microsoft-com:vml" xmlns:pvml="urn:schemas-microsoft-com:office:powerpoint" xmlns:com="http://schemas.openxmlformats.org/drawingml/2006/compatibility" xmlns:p14="http://schemas.microsoft.com/office/powerpoint/2010/main" showMasterSp="0" showMasterPhAnim="0">
   <p:cSld>
     <p:spTree>
       <p:nvGrpSpPr>
-        <p:cNvPr id="135" name="Shape 135"/>
+        <p:cNvPr id="34" name="Shape 34"/>
         <p:cNvGrpSpPr/>
         <p:nvPr/>
       </p:nvGrpSpPr>
@@ -1126,7 +1125,7 @@
       </p:grpSpPr>
       <p:sp>
         <p:nvSpPr>
-          <p:cNvPr id="136" name="Shape 136"/>
+          <p:cNvPr id="35" name="Shape 35"/>
           <p:cNvSpPr/>
           <p:nvPr>
             <p:ph idx="2" type="sldImg"/>
@@ -1160,7 +1159,7 @@
       </p:sp>
       <p:sp>
         <p:nvSpPr>
-          <p:cNvPr id="137" name="Shape 137"/>
+          <p:cNvPr id="36" name="Shape 36"/>
           <p:cNvSpPr txBox="1"/>
           <p:nvPr>
             <p:ph idx="1" type="body"/>
@@ -1191,12 +1190,12 @@
 </p:notes>
 </file>
 
-<file path=ppt/notesSlides/notesSlide2.xml><?xml version="1.0" encoding="utf-8"?>
+<file path=ppt/notesSlides/notesSlide3.xml><?xml version="1.0" encoding="utf-8"?>
 <p:notes xmlns:a="http://schemas.openxmlformats.org/drawingml/2006/main" xmlns:r="http://schemas.openxmlformats.org/officeDocument/2006/relationships" xmlns:mc="http://schemas.openxmlformats.org/markup-compatibility/2006" xmlns:mv="urn:schemas-microsoft-com:mac:vml" xmlns:p="http://schemas.openxmlformats.org/presentationml/2006/main" xmlns:c="http://schemas.openxmlformats.org/drawingml/2006/chart" xmlns:dgm="http://schemas.openxmlformats.org/drawingml/2006/diagram" xmlns:o="urn:schemas-microsoft-com:office:office" xmlns:v="urn:schemas-microsoft-com:vml" xmlns:pvml="urn:schemas-microsoft-com:office:powerpoint" xmlns:com="http://schemas.openxmlformats.org/drawingml/2006/compatibility" xmlns:p14="http://schemas.microsoft.com/office/powerpoint/2010/main" showMasterSp="0" showMasterPhAnim="0">
   <p:cSld>
     <p:spTree>
       <p:nvGrpSpPr>
-        <p:cNvPr id="33" name="Shape 33"/>
+        <p:cNvPr id="41" name="Shape 41"/>
         <p:cNvGrpSpPr/>
         <p:nvPr/>
       </p:nvGrpSpPr>
@@ -1210,7 +1209,7 @@
       </p:grpSpPr>
       <p:sp>
         <p:nvSpPr>
-          <p:cNvPr id="34" name="Shape 34"/>
+          <p:cNvPr id="42" name="Shape 42"/>
           <p:cNvSpPr/>
           <p:nvPr>
             <p:ph idx="2" type="sldImg"/>
@@ -1244,7 +1243,7 @@
       </p:sp>
       <p:sp>
         <p:nvSpPr>
-          <p:cNvPr id="35" name="Shape 35"/>
+          <p:cNvPr id="43" name="Shape 43"/>
           <p:cNvSpPr txBox="1"/>
           <p:nvPr>
             <p:ph idx="1" type="body"/>
@@ -1275,12 +1274,12 @@
 </p:notes>
 </file>
 
-<file path=ppt/notesSlides/notesSlide3.xml><?xml version="1.0" encoding="utf-8"?>
+<file path=ppt/notesSlides/notesSlide4.xml><?xml version="1.0" encoding="utf-8"?>
 <p:notes xmlns:a="http://schemas.openxmlformats.org/drawingml/2006/main" xmlns:r="http://schemas.openxmlformats.org/officeDocument/2006/relationships" xmlns:mc="http://schemas.openxmlformats.org/markup-compatibility/2006" xmlns:mv="urn:schemas-microsoft-com:mac:vml" xmlns:p="http://schemas.openxmlformats.org/presentationml/2006/main" xmlns:c="http://schemas.openxmlformats.org/drawingml/2006/chart" xmlns:dgm="http://schemas.openxmlformats.org/drawingml/2006/diagram" xmlns:o="urn:schemas-microsoft-com:office:office" xmlns:v="urn:schemas-microsoft-com:vml" xmlns:pvml="urn:schemas-microsoft-com:office:powerpoint" xmlns:com="http://schemas.openxmlformats.org/drawingml/2006/compatibility" xmlns:p14="http://schemas.microsoft.com/office/powerpoint/2010/main" showMasterSp="0" showMasterPhAnim="0">
   <p:cSld>
     <p:spTree>
       <p:nvGrpSpPr>
-        <p:cNvPr id="40" name="Shape 40"/>
+        <p:cNvPr id="48" name="Shape 48"/>
         <p:cNvGrpSpPr/>
         <p:nvPr/>
       </p:nvGrpSpPr>
@@ -1294,7 +1293,7 @@
       </p:grpSpPr>
       <p:sp>
         <p:nvSpPr>
-          <p:cNvPr id="41" name="Shape 41"/>
+          <p:cNvPr id="49" name="Shape 49"/>
           <p:cNvSpPr/>
           <p:nvPr>
             <p:ph idx="2" type="sldImg"/>
@@ -1328,7 +1327,7 @@
       </p:sp>
       <p:sp>
         <p:nvSpPr>
-          <p:cNvPr id="42" name="Shape 42"/>
+          <p:cNvPr id="50" name="Shape 50"/>
           <p:cNvSpPr txBox="1"/>
           <p:nvPr>
             <p:ph idx="1" type="body"/>
@@ -1359,12 +1358,12 @@
 </p:notes>
 </file>
 
-<file path=ppt/notesSlides/notesSlide4.xml><?xml version="1.0" encoding="utf-8"?>
+<file path=ppt/notesSlides/notesSlide5.xml><?xml version="1.0" encoding="utf-8"?>
 <p:notes xmlns:a="http://schemas.openxmlformats.org/drawingml/2006/main" xmlns:r="http://schemas.openxmlformats.org/officeDocument/2006/relationships" xmlns:mc="http://schemas.openxmlformats.org/markup-compatibility/2006" xmlns:mv="urn:schemas-microsoft-com:mac:vml" xmlns:p="http://schemas.openxmlformats.org/presentationml/2006/main" xmlns:c="http://schemas.openxmlformats.org/drawingml/2006/chart" xmlns:dgm="http://schemas.openxmlformats.org/drawingml/2006/diagram" xmlns:o="urn:schemas-microsoft-com:office:office" xmlns:v="urn:schemas-microsoft-com:vml" xmlns:pvml="urn:schemas-microsoft-com:office:powerpoint" xmlns:com="http://schemas.openxmlformats.org/drawingml/2006/compatibility" xmlns:p14="http://schemas.microsoft.com/office/powerpoint/2010/main" showMasterSp="0" showMasterPhAnim="0">
   <p:cSld>
     <p:spTree>
       <p:nvGrpSpPr>
-        <p:cNvPr id="47" name="Shape 47"/>
+        <p:cNvPr id="55" name="Shape 55"/>
         <p:cNvGrpSpPr/>
         <p:nvPr/>
       </p:nvGrpSpPr>
@@ -1378,7 +1377,7 @@
       </p:grpSpPr>
       <p:sp>
         <p:nvSpPr>
-          <p:cNvPr id="48" name="Shape 48"/>
+          <p:cNvPr id="56" name="Shape 56"/>
           <p:cNvSpPr/>
           <p:nvPr>
             <p:ph idx="2" type="sldImg"/>
@@ -1412,7 +1411,7 @@
       </p:sp>
       <p:sp>
         <p:nvSpPr>
-          <p:cNvPr id="49" name="Shape 49"/>
+          <p:cNvPr id="57" name="Shape 57"/>
           <p:cNvSpPr txBox="1"/>
           <p:nvPr>
             <p:ph idx="1" type="body"/>
@@ -1443,12 +1442,12 @@
 </p:notes>
 </file>
 
-<file path=ppt/notesSlides/notesSlide5.xml><?xml version="1.0" encoding="utf-8"?>
+<file path=ppt/notesSlides/notesSlide6.xml><?xml version="1.0" encoding="utf-8"?>
 <p:notes xmlns:a="http://schemas.openxmlformats.org/drawingml/2006/main" xmlns:r="http://schemas.openxmlformats.org/officeDocument/2006/relationships" xmlns:mc="http://schemas.openxmlformats.org/markup-compatibility/2006" xmlns:mv="urn:schemas-microsoft-com:mac:vml" xmlns:p="http://schemas.openxmlformats.org/presentationml/2006/main" xmlns:c="http://schemas.openxmlformats.org/drawingml/2006/chart" xmlns:dgm="http://schemas.openxmlformats.org/drawingml/2006/diagram" xmlns:o="urn:schemas-microsoft-com:office:office" xmlns:v="urn:schemas-microsoft-com:vml" xmlns:pvml="urn:schemas-microsoft-com:office:powerpoint" xmlns:com="http://schemas.openxmlformats.org/drawingml/2006/compatibility" xmlns:p14="http://schemas.microsoft.com/office/powerpoint/2010/main" showMasterSp="0" showMasterPhAnim="0">
   <p:cSld>
     <p:spTree>
       <p:nvGrpSpPr>
-        <p:cNvPr id="54" name="Shape 54"/>
+        <p:cNvPr id="62" name="Shape 62"/>
         <p:cNvGrpSpPr/>
         <p:nvPr/>
       </p:nvGrpSpPr>
@@ -1462,7 +1461,7 @@
       </p:grpSpPr>
       <p:sp>
         <p:nvSpPr>
-          <p:cNvPr id="55" name="Shape 55"/>
+          <p:cNvPr id="63" name="Shape 63"/>
           <p:cNvSpPr/>
           <p:nvPr>
             <p:ph idx="2" type="sldImg"/>
@@ -1496,7 +1495,7 @@
       </p:sp>
       <p:sp>
         <p:nvSpPr>
-          <p:cNvPr id="56" name="Shape 56"/>
+          <p:cNvPr id="64" name="Shape 64"/>
           <p:cNvSpPr txBox="1"/>
           <p:nvPr>
             <p:ph idx="1" type="body"/>
@@ -1527,12 +1526,12 @@
 </p:notes>
 </file>
 
-<file path=ppt/notesSlides/notesSlide6.xml><?xml version="1.0" encoding="utf-8"?>
+<file path=ppt/notesSlides/notesSlide7.xml><?xml version="1.0" encoding="utf-8"?>
 <p:notes xmlns:a="http://schemas.openxmlformats.org/drawingml/2006/main" xmlns:r="http://schemas.openxmlformats.org/officeDocument/2006/relationships" xmlns:mc="http://schemas.openxmlformats.org/markup-compatibility/2006" xmlns:mv="urn:schemas-microsoft-com:mac:vml" xmlns:p="http://schemas.openxmlformats.org/presentationml/2006/main" xmlns:c="http://schemas.openxmlformats.org/drawingml/2006/chart" xmlns:dgm="http://schemas.openxmlformats.org/drawingml/2006/diagram" xmlns:o="urn:schemas-microsoft-com:office:office" xmlns:v="urn:schemas-microsoft-com:vml" xmlns:pvml="urn:schemas-microsoft-com:office:powerpoint" xmlns:com="http://schemas.openxmlformats.org/drawingml/2006/compatibility" xmlns:p14="http://schemas.microsoft.com/office/powerpoint/2010/main" showMasterSp="0" showMasterPhAnim="0">
   <p:cSld>
     <p:spTree>
       <p:nvGrpSpPr>
-        <p:cNvPr id="61" name="Shape 61"/>
+        <p:cNvPr id="69" name="Shape 69"/>
         <p:cNvGrpSpPr/>
         <p:nvPr/>
       </p:nvGrpSpPr>
@@ -1546,7 +1545,7 @@
       </p:grpSpPr>
       <p:sp>
         <p:nvSpPr>
-          <p:cNvPr id="62" name="Shape 62"/>
+          <p:cNvPr id="70" name="Shape 70"/>
           <p:cNvSpPr/>
           <p:nvPr>
             <p:ph idx="2" type="sldImg"/>
@@ -1580,7 +1579,7 @@
       </p:sp>
       <p:sp>
         <p:nvSpPr>
-          <p:cNvPr id="63" name="Shape 63"/>
+          <p:cNvPr id="71" name="Shape 71"/>
           <p:cNvSpPr txBox="1"/>
           <p:nvPr>
             <p:ph idx="1" type="body"/>
@@ -1611,12 +1610,12 @@
 </p:notes>
 </file>
 
-<file path=ppt/notesSlides/notesSlide7.xml><?xml version="1.0" encoding="utf-8"?>
+<file path=ppt/notesSlides/notesSlide8.xml><?xml version="1.0" encoding="utf-8"?>
 <p:notes xmlns:a="http://schemas.openxmlformats.org/drawingml/2006/main" xmlns:r="http://schemas.openxmlformats.org/officeDocument/2006/relationships" xmlns:mc="http://schemas.openxmlformats.org/markup-compatibility/2006" xmlns:mv="urn:schemas-microsoft-com:mac:vml" xmlns:p="http://schemas.openxmlformats.org/presentationml/2006/main" xmlns:c="http://schemas.openxmlformats.org/drawingml/2006/chart" xmlns:dgm="http://schemas.openxmlformats.org/drawingml/2006/diagram" xmlns:o="urn:schemas-microsoft-com:office:office" xmlns:v="urn:schemas-microsoft-com:vml" xmlns:pvml="urn:schemas-microsoft-com:office:powerpoint" xmlns:com="http://schemas.openxmlformats.org/drawingml/2006/compatibility" xmlns:p14="http://schemas.microsoft.com/office/powerpoint/2010/main" showMasterSp="0" showMasterPhAnim="0">
   <p:cSld>
     <p:spTree>
       <p:nvGrpSpPr>
-        <p:cNvPr id="68" name="Shape 68"/>
+        <p:cNvPr id="75" name="Shape 75"/>
         <p:cNvGrpSpPr/>
         <p:nvPr/>
       </p:nvGrpSpPr>
@@ -1630,7 +1629,7 @@
       </p:grpSpPr>
       <p:sp>
         <p:nvSpPr>
-          <p:cNvPr id="69" name="Shape 69"/>
+          <p:cNvPr id="76" name="Shape 76"/>
           <p:cNvSpPr/>
           <p:nvPr>
             <p:ph idx="2" type="sldImg"/>
@@ -1664,7 +1663,7 @@
       </p:sp>
       <p:sp>
         <p:nvSpPr>
-          <p:cNvPr id="70" name="Shape 70"/>
+          <p:cNvPr id="77" name="Shape 77"/>
           <p:cNvSpPr txBox="1"/>
           <p:nvPr>
             <p:ph idx="1" type="body"/>
@@ -1695,12 +1694,12 @@
 </p:notes>
 </file>
 
-<file path=ppt/notesSlides/notesSlide8.xml><?xml version="1.0" encoding="utf-8"?>
+<file path=ppt/notesSlides/notesSlide9.xml><?xml version="1.0" encoding="utf-8"?>
 <p:notes xmlns:a="http://schemas.openxmlformats.org/drawingml/2006/main" xmlns:r="http://schemas.openxmlformats.org/officeDocument/2006/relationships" xmlns:mc="http://schemas.openxmlformats.org/markup-compatibility/2006" xmlns:mv="urn:schemas-microsoft-com:mac:vml" xmlns:p="http://schemas.openxmlformats.org/presentationml/2006/main" xmlns:c="http://schemas.openxmlformats.org/drawingml/2006/chart" xmlns:dgm="http://schemas.openxmlformats.org/drawingml/2006/diagram" xmlns:o="urn:schemas-microsoft-com:office:office" xmlns:v="urn:schemas-microsoft-com:vml" xmlns:pvml="urn:schemas-microsoft-com:office:powerpoint" xmlns:com="http://schemas.openxmlformats.org/drawingml/2006/compatibility" xmlns:p14="http://schemas.microsoft.com/office/powerpoint/2010/main" showMasterSp="0" showMasterPhAnim="0">
   <p:cSld>
     <p:spTree>
       <p:nvGrpSpPr>
-        <p:cNvPr id="74" name="Shape 74"/>
+        <p:cNvPr id="84" name="Shape 84"/>
         <p:cNvGrpSpPr/>
         <p:nvPr/>
       </p:nvGrpSpPr>
@@ -1714,7 +1713,7 @@
       </p:grpSpPr>
       <p:sp>
         <p:nvSpPr>
-          <p:cNvPr id="75" name="Shape 75"/>
+          <p:cNvPr id="85" name="Shape 85"/>
           <p:cNvSpPr/>
           <p:nvPr>
             <p:ph idx="2" type="sldImg"/>
@@ -1748,91 +1747,7 @@
       </p:sp>
       <p:sp>
         <p:nvSpPr>
-          <p:cNvPr id="76" name="Shape 76"/>
-          <p:cNvSpPr txBox="1"/>
-          <p:nvPr>
-            <p:ph idx="1" type="body"/>
-          </p:nvPr>
-        </p:nvSpPr>
-        <p:spPr>
-          <a:xfrm>
-            <a:off y="4343400" x="685800"/>
-            <a:ext cy="4114800" cx="5486399"/>
-          </a:xfrm>
-          <a:prstGeom prst="rect">
-            <a:avLst/>
-          </a:prstGeom>
-        </p:spPr>
-        <p:txBody>
-          <a:bodyPr bIns="91425" rIns="91425" lIns="91425" tIns="91425" anchor="t" anchorCtr="0">
-            <a:noAutofit/>
-          </a:bodyPr>
-          <a:lstStyle/>
-          <a:p/>
-        </p:txBody>
-      </p:sp>
-    </p:spTree>
-  </p:cSld>
-  <p:clrMapOvr>
-    <a:masterClrMapping/>
-  </p:clrMapOvr>
-</p:notes>
-</file>
-
-<file path=ppt/notesSlides/notesSlide9.xml><?xml version="1.0" encoding="utf-8"?>
-<p:notes xmlns:a="http://schemas.openxmlformats.org/drawingml/2006/main" xmlns:r="http://schemas.openxmlformats.org/officeDocument/2006/relationships" xmlns:mc="http://schemas.openxmlformats.org/markup-compatibility/2006" xmlns:mv="urn:schemas-microsoft-com:mac:vml" xmlns:p="http://schemas.openxmlformats.org/presentationml/2006/main" xmlns:c="http://schemas.openxmlformats.org/drawingml/2006/chart" xmlns:dgm="http://schemas.openxmlformats.org/drawingml/2006/diagram" xmlns:o="urn:schemas-microsoft-com:office:office" xmlns:v="urn:schemas-microsoft-com:vml" xmlns:pvml="urn:schemas-microsoft-com:office:powerpoint" xmlns:com="http://schemas.openxmlformats.org/drawingml/2006/compatibility" xmlns:p14="http://schemas.microsoft.com/office/powerpoint/2010/main" showMasterSp="0" showMasterPhAnim="0">
-  <p:cSld>
-    <p:spTree>
-      <p:nvGrpSpPr>
-        <p:cNvPr id="83" name="Shape 83"/>
-        <p:cNvGrpSpPr/>
-        <p:nvPr/>
-      </p:nvGrpSpPr>
-      <p:grpSpPr>
-        <a:xfrm>
-          <a:off y="0" x="0"/>
-          <a:ext cy="0" cx="0"/>
-          <a:chOff y="0" x="0"/>
-          <a:chExt cy="0" cx="0"/>
-        </a:xfrm>
-      </p:grpSpPr>
-      <p:sp>
-        <p:nvSpPr>
-          <p:cNvPr id="84" name="Shape 84"/>
-          <p:cNvSpPr/>
-          <p:nvPr>
-            <p:ph idx="2" type="sldImg"/>
-          </p:nvPr>
-        </p:nvSpPr>
-        <p:spPr>
-          <a:xfrm>
-            <a:off y="685800" x="1143225"/>
-            <a:ext cy="3429000" cx="4572299"/>
-          </a:xfrm>
-          <a:custGeom>
-            <a:pathLst>
-              <a:path w="120000" extrusionOk="0" h="120000">
-                <a:moveTo>
-                  <a:pt y="0" x="0"/>
-                </a:moveTo>
-                <a:lnTo>
-                  <a:pt y="0" x="120000"/>
-                </a:lnTo>
-                <a:lnTo>
-                  <a:pt y="120000" x="120000"/>
-                </a:lnTo>
-                <a:lnTo>
-                  <a:pt y="120000" x="0"/>
-                </a:lnTo>
-                <a:close/>
-              </a:path>
-            </a:pathLst>
-          </a:custGeom>
-        </p:spPr>
-      </p:sp>
-      <p:sp>
-        <p:nvSpPr>
-          <p:cNvPr id="85" name="Shape 85"/>
+          <p:cNvPr id="86" name="Shape 86"/>
           <p:cNvSpPr txBox="1"/>
           <p:nvPr>
             <p:ph idx="1" type="body"/>
@@ -4412,7 +4327,7 @@
         </p:nvSpPr>
         <p:spPr>
           <a:xfrm>
-            <a:off y="2034137" x="685800"/>
+            <a:off y="1675887" x="685800"/>
             <a:ext cy="1046400" cx="7772400"/>
           </a:xfrm>
           <a:prstGeom prst="rect">
@@ -4456,6 +4371,43 @@
             </a:stretch>
           </a:blipFill>
         </p:spPr>
+      </p:sp>
+      <p:sp>
+        <p:nvSpPr>
+          <p:cNvPr id="26" name="Shape 26"/>
+          <p:cNvSpPr txBox="1"/>
+          <p:nvPr/>
+        </p:nvSpPr>
+        <p:spPr>
+          <a:xfrm>
+            <a:off y="2456600" x="2388355"/>
+            <a:ext cy="494700" cx="4350299"/>
+          </a:xfrm>
+          <a:prstGeom prst="rect">
+            <a:avLst/>
+          </a:prstGeom>
+          <a:noFill/>
+        </p:spPr>
+        <p:txBody>
+          <a:bodyPr bIns="91425" rIns="91425" lIns="91425" tIns="91425" anchor="t" anchorCtr="0">
+            <a:noAutofit/>
+          </a:bodyPr>
+          <a:lstStyle/>
+          <a:p>
+            <a:pPr algn="ctr">
+              <a:buNone/>
+            </a:pPr>
+            <a:r>
+              <a:rPr u="sng" sz="1800" lang="en">
+                <a:solidFill>
+                  <a:schemeClr val="hlink"/>
+                </a:solidFill>
+                <a:hlinkClick r:id="rId4"/>
+              </a:rPr>
+              <a:t>github.com/beneills/candide</a:t>
+            </a:r>
+          </a:p>
+        </p:txBody>
       </p:sp>
     </p:spTree>
   </p:cSld>
@@ -4473,7 +4425,7 @@
   <p:cSld>
     <p:spTree>
       <p:nvGrpSpPr>
-        <p:cNvPr id="86" name="Shape 86"/>
+        <p:cNvPr id="87" name="Shape 87"/>
         <p:cNvGrpSpPr/>
         <p:nvPr/>
       </p:nvGrpSpPr>
@@ -4487,7 +4439,7 @@
       </p:grpSpPr>
       <p:sp>
         <p:nvSpPr>
-          <p:cNvPr id="87" name="Shape 87"/>
+          <p:cNvPr id="88" name="Shape 88"/>
           <p:cNvSpPr txBox="1"/>
           <p:nvPr>
             <p:ph type="title"/>
@@ -4520,7 +4472,7 @@
       </p:sp>
       <p:sp>
         <p:nvSpPr>
-          <p:cNvPr id="88" name="Shape 88"/>
+          <p:cNvPr id="89" name="Shape 89"/>
           <p:cNvSpPr txBox="1"/>
           <p:nvPr>
             <p:ph idx="1" type="body"/>
@@ -4567,7 +4519,7 @@
       </p:sp>
       <p:sp>
         <p:nvSpPr>
-          <p:cNvPr id="89" name="Shape 89"/>
+          <p:cNvPr id="90" name="Shape 90"/>
           <p:cNvSpPr/>
           <p:nvPr/>
         </p:nvSpPr>
@@ -4603,7 +4555,7 @@
   <p:cSld>
     <p:spTree>
       <p:nvGrpSpPr>
-        <p:cNvPr id="93" name="Shape 93"/>
+        <p:cNvPr id="94" name="Shape 94"/>
         <p:cNvGrpSpPr/>
         <p:nvPr/>
       </p:nvGrpSpPr>
@@ -4617,74 +4569,28 @@
       </p:grpSpPr>
       <p:sp>
         <p:nvSpPr>
-          <p:cNvPr id="94" name="Shape 94"/>
-          <p:cNvSpPr txBox="1"/>
-          <p:nvPr>
-            <p:ph type="title"/>
-          </p:nvPr>
-        </p:nvSpPr>
-        <p:spPr>
-          <a:xfrm>
-            <a:off y="274637" x="457200"/>
-            <a:ext cy="1143000" cx="8229600"/>
+          <p:cNvPr id="95" name="Shape 95"/>
+          <p:cNvSpPr/>
+          <p:nvPr/>
+        </p:nvSpPr>
+        <p:spPr>
+          <a:xfrm>
+            <a:off y="433320" x="803983"/>
+            <a:ext cy="5991360" cx="7536032"/>
           </a:xfrm>
           <a:prstGeom prst="rect">
             <a:avLst/>
           </a:prstGeom>
-        </p:spPr>
-        <p:txBody>
-          <a:bodyPr bIns="91425" rIns="91425" lIns="91425" tIns="91425" anchor="b" anchorCtr="0">
-            <a:noAutofit/>
-          </a:bodyPr>
-          <a:lstStyle/>
-          <a:p>
-            <a:pPr>
-              <a:buNone/>
-            </a:pPr>
-            <a:r>
-              <a:rPr lang="en"/>
-              <a:t>L'insignifiance de l'homme</a:t>
-            </a:r>
-          </a:p>
-        </p:txBody>
-      </p:sp>
-      <p:sp>
-        <p:nvSpPr>
-          <p:cNvPr id="95" name="Shape 95"/>
-          <p:cNvSpPr txBox="1"/>
-          <p:nvPr>
-            <p:ph idx="1" type="body"/>
-          </p:nvPr>
-        </p:nvSpPr>
-        <p:spPr>
-          <a:xfrm>
-            <a:off y="1600200" x="457200"/>
-            <a:ext cy="4967700" cx="8229600"/>
-          </a:xfrm>
-          <a:prstGeom prst="rect">
-            <a:avLst/>
-          </a:prstGeom>
-        </p:spPr>
-        <p:txBody>
-          <a:bodyPr bIns="91425" rIns="91425" lIns="91425" tIns="91425" anchor="t" anchorCtr="0">
-            <a:noAutofit/>
-          </a:bodyPr>
-          <a:lstStyle/>
-          <a:p>
-            <a:pPr lvl="0" indent="-419100" marL="457200">
-              <a:buClr>
-                <a:schemeClr val="dk1"/>
-              </a:buClr>
-              <a:buSzPct val="166666"/>
-              <a:buFont typeface="Arial"/>
-              <a:buChar char="•"/>
-            </a:pPr>
-            <a:r>
-              <a:rPr lang="en"/>
-              <a:t>Peu importe qu'ils fassent, ils TODO </a:t>
-            </a:r>
-          </a:p>
-        </p:txBody>
+          <a:blipFill>
+            <a:blip r:embed="rId3"/>
+            <a:stretch>
+              <a:fillRect/>
+            </a:stretch>
+          </a:blipFill>
+          <a:ln>
+            <a:noFill/>
+          </a:ln>
+        </p:spPr>
       </p:sp>
     </p:spTree>
   </p:cSld>
@@ -4722,8 +4628,8 @@
         </p:nvSpPr>
         <p:spPr>
           <a:xfrm>
-            <a:off y="433320" x="803983"/>
-            <a:ext cy="5991360" cx="7536032"/>
+            <a:off y="515837" x="474577"/>
+            <a:ext cy="5826325" cx="8194844"/>
           </a:xfrm>
           <a:prstGeom prst="rect">
             <a:avLst/>
@@ -4775,8 +4681,8 @@
         </p:nvSpPr>
         <p:spPr>
           <a:xfrm>
-            <a:off y="515837" x="474577"/>
-            <a:ext cy="5826325" cx="8194844"/>
+            <a:off y="347676" x="697071"/>
+            <a:ext cy="6162647" cx="7749857"/>
           </a:xfrm>
           <a:prstGeom prst="rect">
             <a:avLst/>
@@ -4823,13 +4729,98 @@
       <p:sp>
         <p:nvSpPr>
           <p:cNvPr id="110" name="Shape 110"/>
+          <p:cNvSpPr txBox="1"/>
+          <p:nvPr>
+            <p:ph type="title"/>
+          </p:nvPr>
+        </p:nvSpPr>
+        <p:spPr>
+          <a:xfrm>
+            <a:off y="0" x="447675"/>
+            <a:ext cy="1143000" cx="8229600"/>
+          </a:xfrm>
+          <a:prstGeom prst="rect">
+            <a:avLst/>
+          </a:prstGeom>
+        </p:spPr>
+        <p:txBody>
+          <a:bodyPr bIns="91425" rIns="91425" lIns="91425" tIns="91425" anchor="b" anchorCtr="0">
+            <a:noAutofit/>
+          </a:bodyPr>
+          <a:lstStyle/>
+          <a:p>
+            <a:pPr>
+              <a:buNone/>
+            </a:pPr>
+            <a:r>
+              <a:rPr lang="en"/>
+              <a:t>Statistiques</a:t>
+            </a:r>
+          </a:p>
+        </p:txBody>
+      </p:sp>
+      <p:sp>
+        <p:nvSpPr>
+          <p:cNvPr id="111" name="Shape 111"/>
+          <p:cNvSpPr txBox="1"/>
+          <p:nvPr>
+            <p:ph idx="1" type="body"/>
+          </p:nvPr>
+        </p:nvSpPr>
+        <p:spPr>
+          <a:xfrm>
+            <a:off y="1310000" x="457200"/>
+            <a:ext cy="4967700" cx="8229600"/>
+          </a:xfrm>
+          <a:prstGeom prst="rect">
+            <a:avLst/>
+          </a:prstGeom>
+        </p:spPr>
+        <p:txBody>
+          <a:bodyPr bIns="91425" rIns="91425" lIns="91425" tIns="91425" anchor="t" anchorCtr="0">
+            <a:noAutofit/>
+          </a:bodyPr>
+          <a:lstStyle/>
+          <a:p>
+            <a:pPr rtl="0" lvl="0" indent="-419100" marL="457200">
+              <a:buClr>
+                <a:schemeClr val="dk1"/>
+              </a:buClr>
+              <a:buSzPct val="166666"/>
+              <a:buFont typeface="Arial"/>
+              <a:buChar char="•"/>
+            </a:pPr>
+            <a:r>
+              <a:rPr lang="en"/>
+              <a:t>184.226 caractères</a:t>
+            </a:r>
+          </a:p>
+          <a:p>
+            <a:pPr rtl="0" lvl="0" indent="-419100" marL="457200">
+              <a:buClr>
+                <a:schemeClr val="dk1"/>
+              </a:buClr>
+              <a:buSzPct val="166666"/>
+              <a:buFont typeface="Arial"/>
+              <a:buChar char="•"/>
+            </a:pPr>
+            <a:r>
+              <a:rPr lang="en"/>
+              <a:t>32.458 mots</a:t>
+            </a:r>
+          </a:p>
+        </p:txBody>
+      </p:sp>
+      <p:sp>
+        <p:nvSpPr>
+          <p:cNvPr id="112" name="Shape 112"/>
           <p:cNvSpPr/>
           <p:nvPr/>
         </p:nvSpPr>
         <p:spPr>
           <a:xfrm>
-            <a:off y="347676" x="697071"/>
-            <a:ext cy="6162647" cx="7749857"/>
+            <a:off y="2315825" x="438150"/>
+            <a:ext cy="4191000" cx="8248650"/>
           </a:xfrm>
           <a:prstGeom prst="rect">
             <a:avLst/>
@@ -4861,7 +4852,7 @@
   <p:cSld>
     <p:spTree>
       <p:nvGrpSpPr>
-        <p:cNvPr id="114" name="Shape 114"/>
+        <p:cNvPr id="116" name="Shape 116"/>
         <p:cNvGrpSpPr/>
         <p:nvPr/>
       </p:nvGrpSpPr>
@@ -4875,7 +4866,7 @@
       </p:grpSpPr>
       <p:sp>
         <p:nvSpPr>
-          <p:cNvPr id="115" name="Shape 115"/>
+          <p:cNvPr id="117" name="Shape 117"/>
           <p:cNvSpPr txBox="1"/>
           <p:nvPr>
             <p:ph type="title"/>
@@ -4883,8 +4874,8 @@
         </p:nvSpPr>
         <p:spPr>
           <a:xfrm>
-            <a:off y="0" x="447675"/>
-            <a:ext cy="1143000" cx="8229600"/>
+            <a:off y="198282" x="457200"/>
+            <a:ext cy="883200" cx="8229600"/>
           </a:xfrm>
           <a:prstGeom prst="rect">
             <a:avLst/>
@@ -4901,73 +4892,21 @@
             </a:pPr>
             <a:r>
               <a:rPr lang="en"/>
-              <a:t>Statistiques</a:t>
+              <a:t>Le Code</a:t>
             </a:r>
           </a:p>
         </p:txBody>
       </p:sp>
       <p:sp>
         <p:nvSpPr>
-          <p:cNvPr id="116" name="Shape 116"/>
-          <p:cNvSpPr txBox="1"/>
-          <p:nvPr>
-            <p:ph idx="1" type="body"/>
-          </p:nvPr>
-        </p:nvSpPr>
-        <p:spPr>
-          <a:xfrm>
-            <a:off y="1310000" x="457200"/>
-            <a:ext cy="4967700" cx="8229600"/>
-          </a:xfrm>
-          <a:prstGeom prst="rect">
-            <a:avLst/>
-          </a:prstGeom>
-        </p:spPr>
-        <p:txBody>
-          <a:bodyPr bIns="91425" rIns="91425" lIns="91425" tIns="91425" anchor="t" anchorCtr="0">
-            <a:noAutofit/>
-          </a:bodyPr>
-          <a:lstStyle/>
-          <a:p>
-            <a:pPr rtl="0" lvl="0" indent="-419100" marL="457200">
-              <a:buClr>
-                <a:schemeClr val="dk1"/>
-              </a:buClr>
-              <a:buSzPct val="166666"/>
-              <a:buFont typeface="Arial"/>
-              <a:buChar char="•"/>
-            </a:pPr>
-            <a:r>
-              <a:rPr lang="en"/>
-              <a:t>184.226 caractères</a:t>
-            </a:r>
-          </a:p>
-          <a:p>
-            <a:pPr rtl="0" lvl="0" indent="-419100" marL="457200">
-              <a:buClr>
-                <a:schemeClr val="dk1"/>
-              </a:buClr>
-              <a:buSzPct val="166666"/>
-              <a:buFont typeface="Arial"/>
-              <a:buChar char="•"/>
-            </a:pPr>
-            <a:r>
-              <a:rPr lang="en"/>
-              <a:t>32.458 mots</a:t>
-            </a:r>
-          </a:p>
-        </p:txBody>
-      </p:sp>
-      <p:sp>
-        <p:nvSpPr>
-          <p:cNvPr id="117" name="Shape 117"/>
+          <p:cNvPr id="118" name="Shape 118"/>
           <p:cNvSpPr/>
           <p:nvPr/>
         </p:nvSpPr>
         <p:spPr>
           <a:xfrm>
-            <a:off y="2315825" x="438150"/>
-            <a:ext cy="4191000" cx="8248650"/>
+            <a:off y="1683275" x="172750"/>
+            <a:ext cy="4450659" cx="8758527"/>
           </a:xfrm>
           <a:prstGeom prst="rect">
             <a:avLst/>
@@ -4999,7 +4938,7 @@
   <p:cSld>
     <p:spTree>
       <p:nvGrpSpPr>
-        <p:cNvPr id="121" name="Shape 121"/>
+        <p:cNvPr id="122" name="Shape 122"/>
         <p:cNvGrpSpPr/>
         <p:nvPr/>
       </p:nvGrpSpPr>
@@ -5013,47 +4952,14 @@
       </p:grpSpPr>
       <p:sp>
         <p:nvSpPr>
-          <p:cNvPr id="122" name="Shape 122"/>
-          <p:cNvSpPr txBox="1"/>
-          <p:nvPr>
-            <p:ph type="title"/>
-          </p:nvPr>
-        </p:nvSpPr>
-        <p:spPr>
-          <a:xfrm>
-            <a:off y="198282" x="457200"/>
-            <a:ext cy="883200" cx="8229600"/>
-          </a:xfrm>
-          <a:prstGeom prst="rect">
-            <a:avLst/>
-          </a:prstGeom>
-        </p:spPr>
-        <p:txBody>
-          <a:bodyPr bIns="91425" rIns="91425" lIns="91425" tIns="91425" anchor="b" anchorCtr="0">
-            <a:noAutofit/>
-          </a:bodyPr>
-          <a:lstStyle/>
-          <a:p>
-            <a:pPr>
-              <a:buNone/>
-            </a:pPr>
-            <a:r>
-              <a:rPr lang="en"/>
-              <a:t>Le Code</a:t>
-            </a:r>
-          </a:p>
-        </p:txBody>
-      </p:sp>
-      <p:sp>
-        <p:nvSpPr>
           <p:cNvPr id="123" name="Shape 123"/>
           <p:cNvSpPr/>
           <p:nvPr/>
         </p:nvSpPr>
         <p:spPr>
           <a:xfrm>
-            <a:off y="1683275" x="172750"/>
-            <a:ext cy="4450659" cx="8758527"/>
+            <a:off y="676542" x="-268250"/>
+            <a:ext cy="5508956" cx="9687187"/>
           </a:xfrm>
           <a:prstGeom prst="rect">
             <a:avLst/>
@@ -5100,59 +5006,6 @@
       <p:sp>
         <p:nvSpPr>
           <p:cNvPr id="128" name="Shape 128"/>
-          <p:cNvSpPr/>
-          <p:nvPr/>
-        </p:nvSpPr>
-        <p:spPr>
-          <a:xfrm>
-            <a:off y="676542" x="-268250"/>
-            <a:ext cy="5508956" cx="9687187"/>
-          </a:xfrm>
-          <a:prstGeom prst="rect">
-            <a:avLst/>
-          </a:prstGeom>
-          <a:blipFill>
-            <a:blip r:embed="rId3"/>
-            <a:stretch>
-              <a:fillRect/>
-            </a:stretch>
-          </a:blipFill>
-          <a:ln>
-            <a:noFill/>
-          </a:ln>
-        </p:spPr>
-      </p:sp>
-    </p:spTree>
-  </p:cSld>
-  <p:clrMapOvr>
-    <a:masterClrMapping/>
-  </p:clrMapOvr>
-  <p:transition spd="slow">
-    <p:cut/>
-  </p:transition>
-</p:sld>
-</file>
-
-<file path=ppt/slides/slide18.xml><?xml version="1.0" encoding="utf-8"?>
-<p:sld xmlns:a="http://schemas.openxmlformats.org/drawingml/2006/main" xmlns:r="http://schemas.openxmlformats.org/officeDocument/2006/relationships" xmlns:mc="http://schemas.openxmlformats.org/markup-compatibility/2006" xmlns:mv="urn:schemas-microsoft-com:mac:vml" xmlns:p="http://schemas.openxmlformats.org/presentationml/2006/main" xmlns:c="http://schemas.openxmlformats.org/drawingml/2006/chart" xmlns:dgm="http://schemas.openxmlformats.org/drawingml/2006/diagram" xmlns:o="urn:schemas-microsoft-com:office:office" xmlns:v="urn:schemas-microsoft-com:vml" xmlns:pvml="urn:schemas-microsoft-com:office:powerpoint" xmlns:com="http://schemas.openxmlformats.org/drawingml/2006/compatibility" xmlns:p14="http://schemas.microsoft.com/office/powerpoint/2010/main">
-  <p:cSld>
-    <p:spTree>
-      <p:nvGrpSpPr>
-        <p:cNvPr id="132" name="Shape 132"/>
-        <p:cNvGrpSpPr/>
-        <p:nvPr/>
-      </p:nvGrpSpPr>
-      <p:grpSpPr>
-        <a:xfrm>
-          <a:off y="0" x="0"/>
-          <a:ext cy="0" cx="0"/>
-          <a:chOff y="0" x="0"/>
-          <a:chExt cy="0" cx="0"/>
-        </a:xfrm>
-      </p:grpSpPr>
-      <p:sp>
-        <p:nvSpPr>
-          <p:cNvPr id="133" name="Shape 133"/>
           <p:cNvSpPr txBox="1"/>
           <p:nvPr>
             <p:ph type="title"/>
@@ -5185,7 +5038,7 @@
       </p:sp>
       <p:sp>
         <p:nvSpPr>
-          <p:cNvPr id="134" name="Shape 134"/>
+          <p:cNvPr id="129" name="Shape 129"/>
           <p:cNvSpPr txBox="1"/>
           <p:nvPr>
             <p:ph idx="1" type="body"/>
@@ -5242,7 +5095,7 @@
   <p:cSld>
     <p:spTree>
       <p:nvGrpSpPr>
-        <p:cNvPr id="29" name="Shape 29"/>
+        <p:cNvPr id="30" name="Shape 30"/>
         <p:cNvGrpSpPr/>
         <p:nvPr/>
       </p:nvGrpSpPr>
@@ -5256,7 +5109,7 @@
       </p:grpSpPr>
       <p:sp>
         <p:nvSpPr>
-          <p:cNvPr id="30" name="Shape 30"/>
+          <p:cNvPr id="31" name="Shape 31"/>
           <p:cNvSpPr txBox="1"/>
           <p:nvPr>
             <p:ph type="title"/>
@@ -5289,7 +5142,7 @@
       </p:sp>
       <p:sp>
         <p:nvSpPr>
-          <p:cNvPr id="31" name="Shape 31"/>
+          <p:cNvPr id="32" name="Shape 32"/>
           <p:cNvSpPr txBox="1"/>
           <p:nvPr>
             <p:ph idx="1" type="body"/>
@@ -5394,7 +5247,7 @@
       </p:sp>
       <p:sp>
         <p:nvSpPr>
-          <p:cNvPr id="32" name="Shape 32"/>
+          <p:cNvPr id="33" name="Shape 33"/>
           <p:cNvSpPr/>
           <p:nvPr/>
         </p:nvSpPr>
@@ -5430,7 +5283,7 @@
   <p:cSld>
     <p:spTree>
       <p:nvGrpSpPr>
-        <p:cNvPr id="36" name="Shape 36"/>
+        <p:cNvPr id="37" name="Shape 37"/>
         <p:cNvGrpSpPr/>
         <p:nvPr/>
       </p:nvGrpSpPr>
@@ -5444,7 +5297,7 @@
       </p:grpSpPr>
       <p:sp>
         <p:nvSpPr>
-          <p:cNvPr id="37" name="Shape 37"/>
+          <p:cNvPr id="38" name="Shape 38"/>
           <p:cNvSpPr/>
           <p:nvPr/>
         </p:nvSpPr>
@@ -5466,7 +5319,7 @@
       </p:sp>
       <p:sp>
         <p:nvSpPr>
-          <p:cNvPr id="38" name="Shape 38"/>
+          <p:cNvPr id="39" name="Shape 39"/>
           <p:cNvSpPr txBox="1"/>
           <p:nvPr>
             <p:ph type="title"/>
@@ -5499,7 +5352,7 @@
       </p:sp>
       <p:sp>
         <p:nvSpPr>
-          <p:cNvPr id="39" name="Shape 39"/>
+          <p:cNvPr id="40" name="Shape 40"/>
           <p:cNvSpPr txBox="1"/>
           <p:nvPr>
             <p:ph idx="1" type="body"/>
@@ -5640,7 +5493,7 @@
                                       <p:cBhvr>
                                         <p:cTn dur="1000" fill="hold"/>
                                         <p:tgtEl>
-                                          <p:spTgt spid="37"/>
+                                          <p:spTgt spid="38"/>
                                         </p:tgtEl>
                                         <p:attrNameLst>
                                           <p:attrName>r</p:attrName>
@@ -5686,7 +5539,7 @@
   <p:cSld>
     <p:spTree>
       <p:nvGrpSpPr>
-        <p:cNvPr id="43" name="Shape 43"/>
+        <p:cNvPr id="44" name="Shape 44"/>
         <p:cNvGrpSpPr/>
         <p:nvPr/>
       </p:nvGrpSpPr>
@@ -5700,7 +5553,7 @@
       </p:grpSpPr>
       <p:sp>
         <p:nvSpPr>
-          <p:cNvPr id="44" name="Shape 44"/>
+          <p:cNvPr id="45" name="Shape 45"/>
           <p:cNvSpPr/>
           <p:nvPr/>
         </p:nvSpPr>
@@ -5722,7 +5575,7 @@
       </p:sp>
       <p:sp>
         <p:nvSpPr>
-          <p:cNvPr id="45" name="Shape 45"/>
+          <p:cNvPr id="46" name="Shape 46"/>
           <p:cNvSpPr txBox="1"/>
           <p:nvPr>
             <p:ph type="title"/>
@@ -5755,7 +5608,7 @@
       </p:sp>
       <p:sp>
         <p:nvSpPr>
-          <p:cNvPr id="46" name="Shape 46"/>
+          <p:cNvPr id="47" name="Shape 47"/>
           <p:cNvSpPr txBox="1"/>
           <p:nvPr>
             <p:ph idx="1" type="body"/>
@@ -5863,7 +5716,7 @@
   <p:cSld>
     <p:spTree>
       <p:nvGrpSpPr>
-        <p:cNvPr id="50" name="Shape 50"/>
+        <p:cNvPr id="51" name="Shape 51"/>
         <p:cNvGrpSpPr/>
         <p:nvPr/>
       </p:nvGrpSpPr>
@@ -5877,7 +5730,7 @@
       </p:grpSpPr>
       <p:sp>
         <p:nvSpPr>
-          <p:cNvPr id="51" name="Shape 51"/>
+          <p:cNvPr id="52" name="Shape 52"/>
           <p:cNvSpPr txBox="1"/>
           <p:nvPr>
             <p:ph type="title"/>
@@ -5910,7 +5763,7 @@
       </p:sp>
       <p:sp>
         <p:nvSpPr>
-          <p:cNvPr id="52" name="Shape 52"/>
+          <p:cNvPr id="53" name="Shape 53"/>
           <p:cNvSpPr txBox="1"/>
           <p:nvPr>
             <p:ph idx="1" type="body"/>
@@ -5962,7 +5815,7 @@
       </p:sp>
       <p:sp>
         <p:nvSpPr>
-          <p:cNvPr id="53" name="Shape 53"/>
+          <p:cNvPr id="54" name="Shape 54"/>
           <p:cNvSpPr/>
           <p:nvPr/>
         </p:nvSpPr>
@@ -6001,7 +5854,7 @@
   <p:cSld>
     <p:spTree>
       <p:nvGrpSpPr>
-        <p:cNvPr id="57" name="Shape 57"/>
+        <p:cNvPr id="58" name="Shape 58"/>
         <p:cNvGrpSpPr/>
         <p:nvPr/>
       </p:nvGrpSpPr>
@@ -6015,7 +5868,7 @@
       </p:grpSpPr>
       <p:sp>
         <p:nvSpPr>
-          <p:cNvPr id="58" name="Shape 58"/>
+          <p:cNvPr id="59" name="Shape 59"/>
           <p:cNvSpPr txBox="1"/>
           <p:nvPr>
             <p:ph type="title"/>
@@ -6048,7 +5901,7 @@
       </p:sp>
       <p:sp>
         <p:nvSpPr>
-          <p:cNvPr id="59" name="Shape 59"/>
+          <p:cNvPr id="60" name="Shape 60"/>
           <p:cNvSpPr txBox="1"/>
           <p:nvPr>
             <p:ph idx="1" type="body"/>
@@ -6142,7 +5995,7 @@
       </p:sp>
       <p:sp>
         <p:nvSpPr>
-          <p:cNvPr id="60" name="Shape 60"/>
+          <p:cNvPr id="61" name="Shape 61"/>
           <p:cNvSpPr/>
           <p:nvPr/>
         </p:nvSpPr>
@@ -6178,7 +6031,7 @@
   <p:cSld>
     <p:spTree>
       <p:nvGrpSpPr>
-        <p:cNvPr id="64" name="Shape 64"/>
+        <p:cNvPr id="65" name="Shape 65"/>
         <p:cNvGrpSpPr/>
         <p:nvPr/>
       </p:nvGrpSpPr>
@@ -6192,7 +6045,7 @@
       </p:grpSpPr>
       <p:sp>
         <p:nvSpPr>
-          <p:cNvPr id="65" name="Shape 65"/>
+          <p:cNvPr id="66" name="Shape 66"/>
           <p:cNvSpPr txBox="1"/>
           <p:nvPr>
             <p:ph type="title"/>
@@ -6225,7 +6078,7 @@
       </p:sp>
       <p:sp>
         <p:nvSpPr>
-          <p:cNvPr id="66" name="Shape 66"/>
+          <p:cNvPr id="67" name="Shape 67"/>
           <p:cNvSpPr txBox="1"/>
           <p:nvPr>
             <p:ph idx="1" type="body"/>
@@ -6339,7 +6192,7 @@
       </p:sp>
       <p:sp>
         <p:nvSpPr>
-          <p:cNvPr id="67" name="Shape 67"/>
+          <p:cNvPr id="68" name="Shape 68"/>
           <p:cNvSpPr/>
           <p:nvPr/>
         </p:nvSpPr>
@@ -6375,7 +6228,7 @@
   <p:cSld>
     <p:spTree>
       <p:nvGrpSpPr>
-        <p:cNvPr id="71" name="Shape 71"/>
+        <p:cNvPr id="72" name="Shape 72"/>
         <p:cNvGrpSpPr/>
         <p:nvPr/>
       </p:nvGrpSpPr>
@@ -6389,7 +6242,7 @@
       </p:grpSpPr>
       <p:sp>
         <p:nvSpPr>
-          <p:cNvPr id="72" name="Shape 72"/>
+          <p:cNvPr id="73" name="Shape 73"/>
           <p:cNvSpPr txBox="1"/>
           <p:nvPr>
             <p:ph type="title"/>
@@ -6422,7 +6275,7 @@
       </p:sp>
       <p:sp>
         <p:nvSpPr>
-          <p:cNvPr id="73" name="Shape 73"/>
+          <p:cNvPr id="74" name="Shape 74"/>
           <p:cNvSpPr txBox="1"/>
           <p:nvPr>
             <p:ph idx="1" type="body"/>
@@ -6558,7 +6411,7 @@
   <p:cSld>
     <p:spTree>
       <p:nvGrpSpPr>
-        <p:cNvPr id="77" name="Shape 77"/>
+        <p:cNvPr id="78" name="Shape 78"/>
         <p:cNvGrpSpPr/>
         <p:nvPr/>
       </p:nvGrpSpPr>
@@ -6572,7 +6425,7 @@
       </p:grpSpPr>
       <p:sp>
         <p:nvSpPr>
-          <p:cNvPr id="78" name="Shape 78"/>
+          <p:cNvPr id="79" name="Shape 79"/>
           <p:cNvSpPr txBox="1"/>
           <p:nvPr>
             <p:ph type="title"/>
@@ -6605,7 +6458,7 @@
       </p:sp>
       <p:sp>
         <p:nvSpPr>
-          <p:cNvPr id="79" name="Shape 79"/>
+          <p:cNvPr id="80" name="Shape 80"/>
           <p:cNvSpPr txBox="1"/>
           <p:nvPr>
             <p:ph idx="1" type="body"/>
@@ -6671,7 +6524,7 @@
       </p:sp>
       <p:sp>
         <p:nvSpPr>
-          <p:cNvPr id="80" name="Shape 80"/>
+          <p:cNvPr id="81" name="Shape 81"/>
           <p:cNvSpPr/>
           <p:nvPr/>
         </p:nvSpPr>
@@ -6693,7 +6546,7 @@
       </p:sp>
       <p:sp>
         <p:nvSpPr>
-          <p:cNvPr id="81" name="Shape 81"/>
+          <p:cNvPr id="82" name="Shape 82"/>
           <p:cNvSpPr/>
           <p:nvPr/>
         </p:nvSpPr>
@@ -6715,7 +6568,7 @@
       </p:sp>
       <p:sp>
         <p:nvSpPr>
-          <p:cNvPr id="82" name="Shape 82"/>
+          <p:cNvPr id="83" name="Shape 83"/>
           <p:cNvSpPr/>
           <p:nvPr/>
         </p:nvSpPr>
@@ -6773,26 +6626,6 @@
                                       <p:cBhvr>
                                         <p:cTn dur="1000" fill="hold"/>
                                         <p:tgtEl>
-                                          <p:spTgt spid="80"/>
-                                        </p:tgtEl>
-                                        <p:attrNameLst>
-                                          <p:attrName>r</p:attrName>
-                                        </p:attrNameLst>
-                                      </p:cBhvr>
-                                    </p:animRot>
-                                  </p:childTnLst>
-                                </p:cTn>
-                              </p:par>
-                              <p:par>
-                                <p:cTn presetID="8" fill="hold" presetSubtype="0" presetClass="emph" nodeType="withEffect">
-                                  <p:stCondLst>
-                                    <p:cond delay="0"/>
-                                  </p:stCondLst>
-                                  <p:childTnLst>
-                                    <p:animRot by="-21600000">
-                                      <p:cBhvr>
-                                        <p:cTn dur="1000" fill="hold"/>
-                                        <p:tgtEl>
                                           <p:spTgt spid="81"/>
                                         </p:tgtEl>
                                         <p:attrNameLst>
@@ -6814,6 +6647,26 @@
                                         <p:cTn dur="1000" fill="hold"/>
                                         <p:tgtEl>
                                           <p:spTgt spid="82"/>
+                                        </p:tgtEl>
+                                        <p:attrNameLst>
+                                          <p:attrName>r</p:attrName>
+                                        </p:attrNameLst>
+                                      </p:cBhvr>
+                                    </p:animRot>
+                                  </p:childTnLst>
+                                </p:cTn>
+                              </p:par>
+                              <p:par>
+                                <p:cTn presetID="8" fill="hold" presetSubtype="0" presetClass="emph" nodeType="withEffect">
+                                  <p:stCondLst>
+                                    <p:cond delay="0"/>
+                                  </p:stCondLst>
+                                  <p:childTnLst>
+                                    <p:animRot by="-21600000">
+                                      <p:cBhvr>
+                                        <p:cTn dur="1000" fill="hold"/>
+                                        <p:tgtEl>
+                                          <p:spTgt spid="83"/>
                                         </p:tgtEl>
                                         <p:attrNameLst>
                                           <p:attrName>r</p:attrName>
@@ -7132,283 +6985,6 @@
 </file>
 
 <file path=ppt/theme/theme2.xml><?xml version="1.0" encoding="utf-8"?>
-<a:theme xmlns:a="http://schemas.openxmlformats.org/drawingml/2006/main" xmlns:r="http://schemas.openxmlformats.org/officeDocument/2006/relationships">
-  <a:themeElements>
-    <a:clrScheme name="Custom 347">
-      <a:dk1>
-        <a:srgbClr val="000000"/>
-      </a:dk1>
-      <a:lt1>
-        <a:srgbClr val="FFFFFF"/>
-      </a:lt1>
-      <a:dk2>
-        <a:srgbClr val="666666"/>
-      </a:dk2>
-      <a:lt2>
-        <a:srgbClr val="CCCCCC"/>
-      </a:lt2>
-      <a:accent1>
-        <a:srgbClr val="3A81BA"/>
-      </a:accent1>
-      <a:accent2>
-        <a:srgbClr val="D89F39"/>
-      </a:accent2>
-      <a:accent3>
-        <a:srgbClr val="8BAB42"/>
-      </a:accent3>
-      <a:accent4>
-        <a:srgbClr val="57A7B5"/>
-      </a:accent4>
-      <a:accent5>
-        <a:srgbClr val="8B81D2"/>
-      </a:accent5>
-      <a:accent6>
-        <a:srgbClr val="963334"/>
-      </a:accent6>
-      <a:hlink>
-        <a:srgbClr val="1155CC"/>
-      </a:hlink>
-      <a:folHlink>
-        <a:srgbClr val="6611CC"/>
-      </a:folHlink>
-    </a:clrScheme>
-    <a:fontScheme name="Office">
-      <a:majorFont>
-        <a:latin typeface="Arial"/>
-        <a:ea typeface=""/>
-        <a:cs typeface=""/>
-        <a:font typeface="ＭＳ Ｐゴシック" script="Jpan"/>
-        <a:font typeface="맑은 고딕" script="Hang"/>
-        <a:font typeface="宋体" script="Hans"/>
-        <a:font typeface="新細明體" script="Hant"/>
-        <a:font typeface="Times New Roman" script="Arab"/>
-        <a:font typeface="Times New Roman" script="Hebr"/>
-        <a:font typeface="Angsana New" script="Thai"/>
-        <a:font typeface="Nyala" script="Ethi"/>
-        <a:font typeface="Vrinda" script="Beng"/>
-        <a:font typeface="Shruti" script="Gujr"/>
-        <a:font typeface="MoolBoran" script="Khmr"/>
-        <a:font typeface="Tunga" script="Knda"/>
-        <a:font typeface="Raavi" script="Guru"/>
-        <a:font typeface="Euphemia" script="Cans"/>
-        <a:font typeface="Plantagenet Cherokee" script="Cher"/>
-        <a:font typeface="Microsoft Yi Baiti" script="Yiii"/>
-        <a:font typeface="Microsoft Himalaya" script="Tibt"/>
-        <a:font typeface="MV Boli" script="Thaa"/>
-        <a:font typeface="Mangal" script="Deva"/>
-        <a:font typeface="Gautami" script="Telu"/>
-        <a:font typeface="Latha" script="Taml"/>
-        <a:font typeface="Estrangelo Edessa" script="Syrc"/>
-        <a:font typeface="Kalinga" script="Orya"/>
-        <a:font typeface="Kartika" script="Mlym"/>
-        <a:font typeface="DokChampa" script="Laoo"/>
-        <a:font typeface="Iskoola Pota" script="Sinh"/>
-        <a:font typeface="Mongolian Baiti" script="Mong"/>
-        <a:font typeface="Times New Roman" script="Viet"/>
-        <a:font typeface="Microsoft Uighur" script="Uigh"/>
-      </a:majorFont>
-      <a:minorFont>
-        <a:latin typeface="Arial"/>
-        <a:ea typeface=""/>
-        <a:cs typeface=""/>
-        <a:font typeface="ＭＳ Ｐゴシック" script="Jpan"/>
-        <a:font typeface="맑은 고딕" script="Hang"/>
-        <a:font typeface="宋体" script="Hans"/>
-        <a:font typeface="新細明體" script="Hant"/>
-        <a:font typeface="Arial" script="Arab"/>
-        <a:font typeface="Arial" script="Hebr"/>
-        <a:font typeface="Cordia New" script="Thai"/>
-        <a:font typeface="Nyala" script="Ethi"/>
-        <a:font typeface="Vrinda" script="Beng"/>
-        <a:font typeface="Shruti" script="Gujr"/>
-        <a:font typeface="DaunPenh" script="Khmr"/>
-        <a:font typeface="Tunga" script="Knda"/>
-        <a:font typeface="Raavi" script="Guru"/>
-        <a:font typeface="Euphemia" script="Cans"/>
-        <a:font typeface="Plantagenet Cherokee" script="Cher"/>
-        <a:font typeface="Microsoft Yi Baiti" script="Yiii"/>
-        <a:font typeface="Microsoft Himalaya" script="Tibt"/>
-        <a:font typeface="MV Boli" script="Thaa"/>
-        <a:font typeface="Mangal" script="Deva"/>
-        <a:font typeface="Gautami" script="Telu"/>
-        <a:font typeface="Latha" script="Taml"/>
-        <a:font typeface="Estrangelo Edessa" script="Syrc"/>
-        <a:font typeface="Kalinga" script="Orya"/>
-        <a:font typeface="Kartika" script="Mlym"/>
-        <a:font typeface="DokChampa" script="Laoo"/>
-        <a:font typeface="Iskoola Pota" script="Sinh"/>
-        <a:font typeface="Mongolian Baiti" script="Mong"/>
-        <a:font typeface="Arial" script="Viet"/>
-        <a:font typeface="Microsoft Uighur" script="Uigh"/>
-      </a:minorFont>
-    </a:fontScheme>
-    <a:fmtScheme name="Office">
-      <a:fillStyleLst>
-        <a:solidFill>
-          <a:schemeClr val="phClr"/>
-        </a:solidFill>
-        <a:gradFill rotWithShape="1">
-          <a:gsLst>
-            <a:gs pos="0">
-              <a:schemeClr val="phClr">
-                <a:tint val="50000"/>
-                <a:satMod val="300000"/>
-              </a:schemeClr>
-            </a:gs>
-            <a:gs pos="35000">
-              <a:schemeClr val="phClr">
-                <a:tint val="37000"/>
-                <a:satMod val="300000"/>
-              </a:schemeClr>
-            </a:gs>
-            <a:gs pos="100000">
-              <a:schemeClr val="phClr">
-                <a:tint val="15000"/>
-                <a:satMod val="350000"/>
-              </a:schemeClr>
-            </a:gs>
-          </a:gsLst>
-          <a:lin ang="16200000" scaled="1"/>
-        </a:gradFill>
-        <a:gradFill rotWithShape="1">
-          <a:gsLst>
-            <a:gs pos="0">
-              <a:schemeClr val="phClr">
-                <a:tint val="100000"/>
-                <a:shade val="100000"/>
-                <a:satMod val="130000"/>
-              </a:schemeClr>
-            </a:gs>
-            <a:gs pos="100000">
-              <a:schemeClr val="phClr">
-                <a:tint val="50000"/>
-                <a:shade val="100000"/>
-                <a:satMod val="350000"/>
-              </a:schemeClr>
-            </a:gs>
-          </a:gsLst>
-          <a:lin ang="16200000" scaled="0"/>
-        </a:gradFill>
-      </a:fillStyleLst>
-      <a:lnStyleLst>
-        <a:ln w="9525" algn="ctr" cap="flat" cmpd="sng">
-          <a:solidFill>
-            <a:schemeClr val="phClr">
-              <a:shade val="95000"/>
-              <a:satMod val="105000"/>
-            </a:schemeClr>
-          </a:solidFill>
-          <a:prstDash val="solid"/>
-        </a:ln>
-        <a:ln w="25400" algn="ctr" cap="flat" cmpd="sng">
-          <a:solidFill>
-            <a:schemeClr val="phClr"/>
-          </a:solidFill>
-          <a:prstDash val="solid"/>
-        </a:ln>
-        <a:ln w="38100" algn="ctr" cap="flat" cmpd="sng">
-          <a:solidFill>
-            <a:schemeClr val="phClr"/>
-          </a:solidFill>
-          <a:prstDash val="solid"/>
-        </a:ln>
-      </a:lnStyleLst>
-      <a:effectStyleLst>
-        <a:effectStyle>
-          <a:effectLst>
-            <a:outerShdw rotWithShape="0" dir="5400000" blurRad="40000" dist="20000">
-              <a:srgbClr val="000000">
-                <a:alpha val="38000"/>
-              </a:srgbClr>
-            </a:outerShdw>
-          </a:effectLst>
-        </a:effectStyle>
-        <a:effectStyle>
-          <a:effectLst>
-            <a:outerShdw rotWithShape="0" dir="5400000" blurRad="40000" dist="23000">
-              <a:srgbClr val="000000">
-                <a:alpha val="35000"/>
-              </a:srgbClr>
-            </a:outerShdw>
-          </a:effectLst>
-        </a:effectStyle>
-        <a:effectStyle>
-          <a:effectLst>
-            <a:outerShdw rotWithShape="0" dir="5400000" blurRad="40000" dist="23000">
-              <a:srgbClr val="000000">
-                <a:alpha val="35000"/>
-              </a:srgbClr>
-            </a:outerShdw>
-          </a:effectLst>
-          <a:scene3d>
-            <a:camera prst="orthographicFront">
-              <a:rot rev="0" lon="0" lat="0"/>
-            </a:camera>
-            <a:lightRig dir="t" rig="threePt">
-              <a:rot rev="1200000" lon="0" lat="0"/>
-            </a:lightRig>
-          </a:scene3d>
-          <a:sp3d>
-            <a:bevelT w="63500" h="25400"/>
-          </a:sp3d>
-        </a:effectStyle>
-      </a:effectStyleLst>
-      <a:bgFillStyleLst>
-        <a:solidFill>
-          <a:schemeClr val="phClr"/>
-        </a:solidFill>
-        <a:gradFill rotWithShape="1">
-          <a:gsLst>
-            <a:gs pos="0">
-              <a:schemeClr val="phClr">
-                <a:tint val="40000"/>
-                <a:satMod val="350000"/>
-              </a:schemeClr>
-            </a:gs>
-            <a:gs pos="40000">
-              <a:schemeClr val="phClr">
-                <a:tint val="45000"/>
-                <a:shade val="99000"/>
-                <a:satMod val="350000"/>
-              </a:schemeClr>
-            </a:gs>
-            <a:gs pos="100000">
-              <a:schemeClr val="phClr">
-                <a:shade val="20000"/>
-                <a:satMod val="255000"/>
-              </a:schemeClr>
-            </a:gs>
-          </a:gsLst>
-          <a:path path="circle">
-            <a:fillToRect t="-80000" b="180000" r="50000" l="50000"/>
-          </a:path>
-        </a:gradFill>
-        <a:gradFill rotWithShape="1">
-          <a:gsLst>
-            <a:gs pos="0">
-              <a:schemeClr val="phClr">
-                <a:tint val="80000"/>
-                <a:satMod val="300000"/>
-              </a:schemeClr>
-            </a:gs>
-            <a:gs pos="100000">
-              <a:schemeClr val="phClr">
-                <a:shade val="30000"/>
-                <a:satMod val="200000"/>
-              </a:schemeClr>
-            </a:gs>
-          </a:gsLst>
-          <a:path path="circle">
-            <a:fillToRect t="50000" b="50000" r="50000" l="50000"/>
-          </a:path>
-        </a:gradFill>
-      </a:bgFillStyleLst>
-    </a:fmtScheme>
-  </a:themeElements>
-</a:theme>
-</file>
-
-<file path=ppt/theme/theme3.xml><?xml version="1.0" encoding="utf-8"?>
 <a:theme xmlns:a="http://schemas.openxmlformats.org/drawingml/2006/main" xmlns:r="http://schemas.openxmlformats.org/officeDocument/2006/relationships" name="Office Theme">
   <a:themeElements>
     <a:clrScheme name="Office">
@@ -7724,4 +7300,281 @@
   </a:objectDefaults>
   <a:extraClrSchemeLst/>
 </a:theme>
+</file>
+
+<file path=ppt/theme/theme3.xml><?xml version="1.0" encoding="utf-8"?>
+<a:theme xmlns:a="http://schemas.openxmlformats.org/drawingml/2006/main" xmlns:r="http://schemas.openxmlformats.org/officeDocument/2006/relationships">
+  <a:themeElements>
+    <a:clrScheme name="Custom 347">
+      <a:dk1>
+        <a:srgbClr val="000000"/>
+      </a:dk1>
+      <a:lt1>
+        <a:srgbClr val="FFFFFF"/>
+      </a:lt1>
+      <a:dk2>
+        <a:srgbClr val="666666"/>
+      </a:dk2>
+      <a:lt2>
+        <a:srgbClr val="CCCCCC"/>
+      </a:lt2>
+      <a:accent1>
+        <a:srgbClr val="3A81BA"/>
+      </a:accent1>
+      <a:accent2>
+        <a:srgbClr val="D89F39"/>
+      </a:accent2>
+      <a:accent3>
+        <a:srgbClr val="8BAB42"/>
+      </a:accent3>
+      <a:accent4>
+        <a:srgbClr val="57A7B5"/>
+      </a:accent4>
+      <a:accent5>
+        <a:srgbClr val="8B81D2"/>
+      </a:accent5>
+      <a:accent6>
+        <a:srgbClr val="963334"/>
+      </a:accent6>
+      <a:hlink>
+        <a:srgbClr val="1155CC"/>
+      </a:hlink>
+      <a:folHlink>
+        <a:srgbClr val="6611CC"/>
+      </a:folHlink>
+    </a:clrScheme>
+    <a:fontScheme name="Office">
+      <a:majorFont>
+        <a:latin typeface="Arial"/>
+        <a:ea typeface=""/>
+        <a:cs typeface=""/>
+        <a:font typeface="ＭＳ Ｐゴシック" script="Jpan"/>
+        <a:font typeface="맑은 고딕" script="Hang"/>
+        <a:font typeface="宋体" script="Hans"/>
+        <a:font typeface="新細明體" script="Hant"/>
+        <a:font typeface="Times New Roman" script="Arab"/>
+        <a:font typeface="Times New Roman" script="Hebr"/>
+        <a:font typeface="Angsana New" script="Thai"/>
+        <a:font typeface="Nyala" script="Ethi"/>
+        <a:font typeface="Vrinda" script="Beng"/>
+        <a:font typeface="Shruti" script="Gujr"/>
+        <a:font typeface="MoolBoran" script="Khmr"/>
+        <a:font typeface="Tunga" script="Knda"/>
+        <a:font typeface="Raavi" script="Guru"/>
+        <a:font typeface="Euphemia" script="Cans"/>
+        <a:font typeface="Plantagenet Cherokee" script="Cher"/>
+        <a:font typeface="Microsoft Yi Baiti" script="Yiii"/>
+        <a:font typeface="Microsoft Himalaya" script="Tibt"/>
+        <a:font typeface="MV Boli" script="Thaa"/>
+        <a:font typeface="Mangal" script="Deva"/>
+        <a:font typeface="Gautami" script="Telu"/>
+        <a:font typeface="Latha" script="Taml"/>
+        <a:font typeface="Estrangelo Edessa" script="Syrc"/>
+        <a:font typeface="Kalinga" script="Orya"/>
+        <a:font typeface="Kartika" script="Mlym"/>
+        <a:font typeface="DokChampa" script="Laoo"/>
+        <a:font typeface="Iskoola Pota" script="Sinh"/>
+        <a:font typeface="Mongolian Baiti" script="Mong"/>
+        <a:font typeface="Times New Roman" script="Viet"/>
+        <a:font typeface="Microsoft Uighur" script="Uigh"/>
+      </a:majorFont>
+      <a:minorFont>
+        <a:latin typeface="Arial"/>
+        <a:ea typeface=""/>
+        <a:cs typeface=""/>
+        <a:font typeface="ＭＳ Ｐゴシック" script="Jpan"/>
+        <a:font typeface="맑은 고딕" script="Hang"/>
+        <a:font typeface="宋体" script="Hans"/>
+        <a:font typeface="新細明體" script="Hant"/>
+        <a:font typeface="Arial" script="Arab"/>
+        <a:font typeface="Arial" script="Hebr"/>
+        <a:font typeface="Cordia New" script="Thai"/>
+        <a:font typeface="Nyala" script="Ethi"/>
+        <a:font typeface="Vrinda" script="Beng"/>
+        <a:font typeface="Shruti" script="Gujr"/>
+        <a:font typeface="DaunPenh" script="Khmr"/>
+        <a:font typeface="Tunga" script="Knda"/>
+        <a:font typeface="Raavi" script="Guru"/>
+        <a:font typeface="Euphemia" script="Cans"/>
+        <a:font typeface="Plantagenet Cherokee" script="Cher"/>
+        <a:font typeface="Microsoft Yi Baiti" script="Yiii"/>
+        <a:font typeface="Microsoft Himalaya" script="Tibt"/>
+        <a:font typeface="MV Boli" script="Thaa"/>
+        <a:font typeface="Mangal" script="Deva"/>
+        <a:font typeface="Gautami" script="Telu"/>
+        <a:font typeface="Latha" script="Taml"/>
+        <a:font typeface="Estrangelo Edessa" script="Syrc"/>
+        <a:font typeface="Kalinga" script="Orya"/>
+        <a:font typeface="Kartika" script="Mlym"/>
+        <a:font typeface="DokChampa" script="Laoo"/>
+        <a:font typeface="Iskoola Pota" script="Sinh"/>
+        <a:font typeface="Mongolian Baiti" script="Mong"/>
+        <a:font typeface="Arial" script="Viet"/>
+        <a:font typeface="Microsoft Uighur" script="Uigh"/>
+      </a:minorFont>
+    </a:fontScheme>
+    <a:fmtScheme name="Office">
+      <a:fillStyleLst>
+        <a:solidFill>
+          <a:schemeClr val="phClr"/>
+        </a:solidFill>
+        <a:gradFill rotWithShape="1">
+          <a:gsLst>
+            <a:gs pos="0">
+              <a:schemeClr val="phClr">
+                <a:tint val="50000"/>
+                <a:satMod val="300000"/>
+              </a:schemeClr>
+            </a:gs>
+            <a:gs pos="35000">
+              <a:schemeClr val="phClr">
+                <a:tint val="37000"/>
+                <a:satMod val="300000"/>
+              </a:schemeClr>
+            </a:gs>
+            <a:gs pos="100000">
+              <a:schemeClr val="phClr">
+                <a:tint val="15000"/>
+                <a:satMod val="350000"/>
+              </a:schemeClr>
+            </a:gs>
+          </a:gsLst>
+          <a:lin ang="16200000" scaled="1"/>
+        </a:gradFill>
+        <a:gradFill rotWithShape="1">
+          <a:gsLst>
+            <a:gs pos="0">
+              <a:schemeClr val="phClr">
+                <a:tint val="100000"/>
+                <a:shade val="100000"/>
+                <a:satMod val="130000"/>
+              </a:schemeClr>
+            </a:gs>
+            <a:gs pos="100000">
+              <a:schemeClr val="phClr">
+                <a:tint val="50000"/>
+                <a:shade val="100000"/>
+                <a:satMod val="350000"/>
+              </a:schemeClr>
+            </a:gs>
+          </a:gsLst>
+          <a:lin ang="16200000" scaled="0"/>
+        </a:gradFill>
+      </a:fillStyleLst>
+      <a:lnStyleLst>
+        <a:ln w="9525" algn="ctr" cap="flat" cmpd="sng">
+          <a:solidFill>
+            <a:schemeClr val="phClr">
+              <a:shade val="95000"/>
+              <a:satMod val="105000"/>
+            </a:schemeClr>
+          </a:solidFill>
+          <a:prstDash val="solid"/>
+        </a:ln>
+        <a:ln w="25400" algn="ctr" cap="flat" cmpd="sng">
+          <a:solidFill>
+            <a:schemeClr val="phClr"/>
+          </a:solidFill>
+          <a:prstDash val="solid"/>
+        </a:ln>
+        <a:ln w="38100" algn="ctr" cap="flat" cmpd="sng">
+          <a:solidFill>
+            <a:schemeClr val="phClr"/>
+          </a:solidFill>
+          <a:prstDash val="solid"/>
+        </a:ln>
+      </a:lnStyleLst>
+      <a:effectStyleLst>
+        <a:effectStyle>
+          <a:effectLst>
+            <a:outerShdw rotWithShape="0" dir="5400000" blurRad="40000" dist="20000">
+              <a:srgbClr val="000000">
+                <a:alpha val="38000"/>
+              </a:srgbClr>
+            </a:outerShdw>
+          </a:effectLst>
+        </a:effectStyle>
+        <a:effectStyle>
+          <a:effectLst>
+            <a:outerShdw rotWithShape="0" dir="5400000" blurRad="40000" dist="23000">
+              <a:srgbClr val="000000">
+                <a:alpha val="35000"/>
+              </a:srgbClr>
+            </a:outerShdw>
+          </a:effectLst>
+        </a:effectStyle>
+        <a:effectStyle>
+          <a:effectLst>
+            <a:outerShdw rotWithShape="0" dir="5400000" blurRad="40000" dist="23000">
+              <a:srgbClr val="000000">
+                <a:alpha val="35000"/>
+              </a:srgbClr>
+            </a:outerShdw>
+          </a:effectLst>
+          <a:scene3d>
+            <a:camera prst="orthographicFront">
+              <a:rot rev="0" lon="0" lat="0"/>
+            </a:camera>
+            <a:lightRig dir="t" rig="threePt">
+              <a:rot rev="1200000" lon="0" lat="0"/>
+            </a:lightRig>
+          </a:scene3d>
+          <a:sp3d>
+            <a:bevelT w="63500" h="25400"/>
+          </a:sp3d>
+        </a:effectStyle>
+      </a:effectStyleLst>
+      <a:bgFillStyleLst>
+        <a:solidFill>
+          <a:schemeClr val="phClr"/>
+        </a:solidFill>
+        <a:gradFill rotWithShape="1">
+          <a:gsLst>
+            <a:gs pos="0">
+              <a:schemeClr val="phClr">
+                <a:tint val="40000"/>
+                <a:satMod val="350000"/>
+              </a:schemeClr>
+            </a:gs>
+            <a:gs pos="40000">
+              <a:schemeClr val="phClr">
+                <a:tint val="45000"/>
+                <a:shade val="99000"/>
+                <a:satMod val="350000"/>
+              </a:schemeClr>
+            </a:gs>
+            <a:gs pos="100000">
+              <a:schemeClr val="phClr">
+                <a:shade val="20000"/>
+                <a:satMod val="255000"/>
+              </a:schemeClr>
+            </a:gs>
+          </a:gsLst>
+          <a:path path="circle">
+            <a:fillToRect t="-80000" b="180000" r="50000" l="50000"/>
+          </a:path>
+        </a:gradFill>
+        <a:gradFill rotWithShape="1">
+          <a:gsLst>
+            <a:gs pos="0">
+              <a:schemeClr val="phClr">
+                <a:tint val="80000"/>
+                <a:satMod val="300000"/>
+              </a:schemeClr>
+            </a:gs>
+            <a:gs pos="100000">
+              <a:schemeClr val="phClr">
+                <a:shade val="30000"/>
+                <a:satMod val="200000"/>
+              </a:schemeClr>
+            </a:gs>
+          </a:gsLst>
+          <a:path path="circle">
+            <a:fillToRect t="50000" b="50000" r="50000" l="50000"/>
+          </a:path>
+        </a:gradFill>
+      </a:bgFillStyleLst>
+    </a:fmtScheme>
+  </a:themeElements>
+</a:theme>
 </file>
</xml_diff>